<commit_message>
build cover and backcover by Re:VIEW.
</commit_message>
<xml_diff>
--- a/cover/get-out-of-cpp-beginners-cover.pptx
+++ b/cover/get-out-of-cpp-beginners-cover.pptx
@@ -124,10 +124,6 @@
 </p:presentation>
 </file>
 
-<file path=ppt/revisionInfo.xml><?xml version="1.0" encoding="utf-8"?>
-<p1510:revInfo xmlns:a="http://schemas.openxmlformats.org/drawingml/2006/main" xmlns:r="http://schemas.openxmlformats.org/officeDocument/2006/relationships" xmlns:p1510="http://schemas.microsoft.com/office/powerpoint/2015/10/main"/>
-</file>
-
 <file path=ppt/slideLayouts/slideLayout1.xml><?xml version="1.0" encoding="utf-8"?>
 <p:sldLayout xmlns:a="http://schemas.openxmlformats.org/drawingml/2006/main" xmlns:r="http://schemas.openxmlformats.org/officeDocument/2006/relationships" xmlns:p="http://schemas.openxmlformats.org/presentationml/2006/main" type="title" preserve="1">
   <p:cSld name="タイトル スライド">
@@ -275,7 +271,7 @@
           <a:p>
             <a:fld id="{5E3E1F87-D6EC-4805-85C3-7523356CCD02}" type="datetimeFigureOut">
               <a:rPr kumimoji="1" lang="ja-JP" altLang="en-US" smtClean="0"/>
-              <a:t>2018/10/7</a:t>
+              <a:t>2018/10/11</a:t>
             </a:fld>
             <a:endParaRPr kumimoji="1" lang="ja-JP" altLang="en-US"/>
           </a:p>
@@ -505,7 +501,7 @@
           <a:p>
             <a:fld id="{5E3E1F87-D6EC-4805-85C3-7523356CCD02}" type="datetimeFigureOut">
               <a:rPr kumimoji="1" lang="ja-JP" altLang="en-US" smtClean="0"/>
-              <a:t>2018/10/7</a:t>
+              <a:t>2018/10/11</a:t>
             </a:fld>
             <a:endParaRPr kumimoji="1" lang="ja-JP" altLang="en-US"/>
           </a:p>
@@ -745,7 +741,7 @@
           <a:p>
             <a:fld id="{5E3E1F87-D6EC-4805-85C3-7523356CCD02}" type="datetimeFigureOut">
               <a:rPr kumimoji="1" lang="ja-JP" altLang="en-US" smtClean="0"/>
-              <a:t>2018/10/7</a:t>
+              <a:t>2018/10/11</a:t>
             </a:fld>
             <a:endParaRPr kumimoji="1" lang="ja-JP" altLang="en-US"/>
           </a:p>
@@ -975,7 +971,7 @@
           <a:p>
             <a:fld id="{5E3E1F87-D6EC-4805-85C3-7523356CCD02}" type="datetimeFigureOut">
               <a:rPr kumimoji="1" lang="ja-JP" altLang="en-US" smtClean="0"/>
-              <a:t>2018/10/7</a:t>
+              <a:t>2018/10/11</a:t>
             </a:fld>
             <a:endParaRPr kumimoji="1" lang="ja-JP" altLang="en-US"/>
           </a:p>
@@ -1250,7 +1246,7 @@
           <a:p>
             <a:fld id="{5E3E1F87-D6EC-4805-85C3-7523356CCD02}" type="datetimeFigureOut">
               <a:rPr kumimoji="1" lang="ja-JP" altLang="en-US" smtClean="0"/>
-              <a:t>2018/10/7</a:t>
+              <a:t>2018/10/11</a:t>
             </a:fld>
             <a:endParaRPr kumimoji="1" lang="ja-JP" altLang="en-US"/>
           </a:p>
@@ -1579,7 +1575,7 @@
           <a:p>
             <a:fld id="{5E3E1F87-D6EC-4805-85C3-7523356CCD02}" type="datetimeFigureOut">
               <a:rPr kumimoji="1" lang="ja-JP" altLang="en-US" smtClean="0"/>
-              <a:t>2018/10/7</a:t>
+              <a:t>2018/10/11</a:t>
             </a:fld>
             <a:endParaRPr kumimoji="1" lang="ja-JP" altLang="en-US"/>
           </a:p>
@@ -2055,7 +2051,7 @@
           <a:p>
             <a:fld id="{5E3E1F87-D6EC-4805-85C3-7523356CCD02}" type="datetimeFigureOut">
               <a:rPr kumimoji="1" lang="ja-JP" altLang="en-US" smtClean="0"/>
-              <a:t>2018/10/7</a:t>
+              <a:t>2018/10/11</a:t>
             </a:fld>
             <a:endParaRPr kumimoji="1" lang="ja-JP" altLang="en-US"/>
           </a:p>
@@ -2196,7 +2192,7 @@
           <a:p>
             <a:fld id="{5E3E1F87-D6EC-4805-85C3-7523356CCD02}" type="datetimeFigureOut">
               <a:rPr kumimoji="1" lang="ja-JP" altLang="en-US" smtClean="0"/>
-              <a:t>2018/10/7</a:t>
+              <a:t>2018/10/11</a:t>
             </a:fld>
             <a:endParaRPr kumimoji="1" lang="ja-JP" altLang="en-US"/>
           </a:p>
@@ -2309,7 +2305,7 @@
           <a:p>
             <a:fld id="{5E3E1F87-D6EC-4805-85C3-7523356CCD02}" type="datetimeFigureOut">
               <a:rPr kumimoji="1" lang="ja-JP" altLang="en-US" smtClean="0"/>
-              <a:t>2018/10/7</a:t>
+              <a:t>2018/10/11</a:t>
             </a:fld>
             <a:endParaRPr kumimoji="1" lang="ja-JP" altLang="en-US"/>
           </a:p>
@@ -2652,7 +2648,7 @@
           <a:p>
             <a:fld id="{5E3E1F87-D6EC-4805-85C3-7523356CCD02}" type="datetimeFigureOut">
               <a:rPr kumimoji="1" lang="ja-JP" altLang="en-US" smtClean="0"/>
-              <a:t>2018/10/7</a:t>
+              <a:t>2018/10/11</a:t>
             </a:fld>
             <a:endParaRPr kumimoji="1" lang="ja-JP" altLang="en-US"/>
           </a:p>
@@ -2940,7 +2936,7 @@
           <a:p>
             <a:fld id="{5E3E1F87-D6EC-4805-85C3-7523356CCD02}" type="datetimeFigureOut">
               <a:rPr kumimoji="1" lang="ja-JP" altLang="en-US" smtClean="0"/>
-              <a:t>2018/10/7</a:t>
+              <a:t>2018/10/11</a:t>
             </a:fld>
             <a:endParaRPr kumimoji="1" lang="ja-JP" altLang="en-US"/>
           </a:p>
@@ -3213,7 +3209,7 @@
           <a:p>
             <a:fld id="{5E3E1F87-D6EC-4805-85C3-7523356CCD02}" type="datetimeFigureOut">
               <a:rPr kumimoji="1" lang="ja-JP" altLang="en-US" smtClean="0"/>
-              <a:t>2018/10/7</a:t>
+              <a:t>2018/10/11</a:t>
             </a:fld>
             <a:endParaRPr kumimoji="1" lang="ja-JP" altLang="en-US"/>
           </a:p>

</xml_diff>